<commit_message>
small fix main.py old build deleted
</commit_message>
<xml_diff>
--- a/COVIDcover.pptx
+++ b/COVIDcover.pptx
@@ -8133,7 +8133,7 @@
           <a:p>
             <a:fld id="{F67D0B5C-456B-45EE-8E37-A1692B32837A}" type="datetimeFigureOut">
               <a:rPr lang="ru-RU" smtClean="0"/>
-              <a:t>27.04.2020</a:t>
+              <a:t>07.06.2020</a:t>
             </a:fld>
             <a:endParaRPr lang="ru-RU"/>
           </a:p>
@@ -8408,7 +8408,7 @@
           <a:p>
             <a:fld id="{F67D0B5C-456B-45EE-8E37-A1692B32837A}" type="datetimeFigureOut">
               <a:rPr lang="ru-RU" smtClean="0"/>
-              <a:t>27.04.2020</a:t>
+              <a:t>07.06.2020</a:t>
             </a:fld>
             <a:endParaRPr lang="ru-RU"/>
           </a:p>
@@ -8602,7 +8602,7 @@
           <a:p>
             <a:fld id="{F67D0B5C-456B-45EE-8E37-A1692B32837A}" type="datetimeFigureOut">
               <a:rPr lang="ru-RU" smtClean="0"/>
-              <a:t>27.04.2020</a:t>
+              <a:t>07.06.2020</a:t>
             </a:fld>
             <a:endParaRPr lang="ru-RU"/>
           </a:p>
@@ -8875,7 +8875,7 @@
           <a:p>
             <a:fld id="{F67D0B5C-456B-45EE-8E37-A1692B32837A}" type="datetimeFigureOut">
               <a:rPr lang="ru-RU" smtClean="0"/>
-              <a:t>27.04.2020</a:t>
+              <a:t>07.06.2020</a:t>
             </a:fld>
             <a:endParaRPr lang="ru-RU"/>
           </a:p>
@@ -9216,7 +9216,7 @@
           <a:p>
             <a:fld id="{F67D0B5C-456B-45EE-8E37-A1692B32837A}" type="datetimeFigureOut">
               <a:rPr lang="ru-RU" smtClean="0"/>
-              <a:t>27.04.2020</a:t>
+              <a:t>07.06.2020</a:t>
             </a:fld>
             <a:endParaRPr lang="ru-RU"/>
           </a:p>
@@ -9839,7 +9839,7 @@
           <a:p>
             <a:fld id="{F67D0B5C-456B-45EE-8E37-A1692B32837A}" type="datetimeFigureOut">
               <a:rPr lang="ru-RU" smtClean="0"/>
-              <a:t>27.04.2020</a:t>
+              <a:t>07.06.2020</a:t>
             </a:fld>
             <a:endParaRPr lang="ru-RU"/>
           </a:p>
@@ -10699,7 +10699,7 @@
           <a:p>
             <a:fld id="{F67D0B5C-456B-45EE-8E37-A1692B32837A}" type="datetimeFigureOut">
               <a:rPr lang="ru-RU" smtClean="0"/>
-              <a:t>27.04.2020</a:t>
+              <a:t>07.06.2020</a:t>
             </a:fld>
             <a:endParaRPr lang="ru-RU"/>
           </a:p>
@@ -10869,7 +10869,7 @@
           <a:p>
             <a:fld id="{F67D0B5C-456B-45EE-8E37-A1692B32837A}" type="datetimeFigureOut">
               <a:rPr lang="ru-RU" smtClean="0"/>
-              <a:t>27.04.2020</a:t>
+              <a:t>07.06.2020</a:t>
             </a:fld>
             <a:endParaRPr lang="ru-RU"/>
           </a:p>
@@ -11049,7 +11049,7 @@
           <a:p>
             <a:fld id="{F67D0B5C-456B-45EE-8E37-A1692B32837A}" type="datetimeFigureOut">
               <a:rPr lang="ru-RU" smtClean="0"/>
-              <a:t>27.04.2020</a:t>
+              <a:t>07.06.2020</a:t>
             </a:fld>
             <a:endParaRPr lang="ru-RU"/>
           </a:p>
@@ -11219,7 +11219,7 @@
           <a:p>
             <a:fld id="{F67D0B5C-456B-45EE-8E37-A1692B32837A}" type="datetimeFigureOut">
               <a:rPr lang="ru-RU" smtClean="0"/>
-              <a:t>27.04.2020</a:t>
+              <a:t>07.06.2020</a:t>
             </a:fld>
             <a:endParaRPr lang="ru-RU"/>
           </a:p>
@@ -11466,7 +11466,7 @@
           <a:p>
             <a:fld id="{F67D0B5C-456B-45EE-8E37-A1692B32837A}" type="datetimeFigureOut">
               <a:rPr lang="ru-RU" smtClean="0"/>
-              <a:t>27.04.2020</a:t>
+              <a:t>07.06.2020</a:t>
             </a:fld>
             <a:endParaRPr lang="ru-RU"/>
           </a:p>
@@ -11758,7 +11758,7 @@
           <a:p>
             <a:fld id="{F67D0B5C-456B-45EE-8E37-A1692B32837A}" type="datetimeFigureOut">
               <a:rPr lang="ru-RU" smtClean="0"/>
-              <a:t>27.04.2020</a:t>
+              <a:t>07.06.2020</a:t>
             </a:fld>
             <a:endParaRPr lang="ru-RU"/>
           </a:p>
@@ -12202,7 +12202,7 @@
           <a:p>
             <a:fld id="{F67D0B5C-456B-45EE-8E37-A1692B32837A}" type="datetimeFigureOut">
               <a:rPr lang="ru-RU" smtClean="0"/>
-              <a:t>27.04.2020</a:t>
+              <a:t>07.06.2020</a:t>
             </a:fld>
             <a:endParaRPr lang="ru-RU"/>
           </a:p>
@@ -12320,7 +12320,7 @@
           <a:p>
             <a:fld id="{F67D0B5C-456B-45EE-8E37-A1692B32837A}" type="datetimeFigureOut">
               <a:rPr lang="ru-RU" smtClean="0"/>
-              <a:t>27.04.2020</a:t>
+              <a:t>07.06.2020</a:t>
             </a:fld>
             <a:endParaRPr lang="ru-RU"/>
           </a:p>
@@ -12415,7 +12415,7 @@
           <a:p>
             <a:fld id="{F67D0B5C-456B-45EE-8E37-A1692B32837A}" type="datetimeFigureOut">
               <a:rPr lang="ru-RU" smtClean="0"/>
-              <a:t>27.04.2020</a:t>
+              <a:t>07.06.2020</a:t>
             </a:fld>
             <a:endParaRPr lang="ru-RU"/>
           </a:p>
@@ -12694,7 +12694,7 @@
           <a:p>
             <a:fld id="{F67D0B5C-456B-45EE-8E37-A1692B32837A}" type="datetimeFigureOut">
               <a:rPr lang="ru-RU" smtClean="0"/>
-              <a:t>27.04.2020</a:t>
+              <a:t>07.06.2020</a:t>
             </a:fld>
             <a:endParaRPr lang="ru-RU"/>
           </a:p>
@@ -12969,7 +12969,7 @@
           <a:p>
             <a:fld id="{F67D0B5C-456B-45EE-8E37-A1692B32837A}" type="datetimeFigureOut">
               <a:rPr lang="ru-RU" smtClean="0"/>
-              <a:t>27.04.2020</a:t>
+              <a:t>07.06.2020</a:t>
             </a:fld>
             <a:endParaRPr lang="ru-RU"/>
           </a:p>
@@ -13398,7 +13398,7 @@
           <a:p>
             <a:fld id="{F67D0B5C-456B-45EE-8E37-A1692B32837A}" type="datetimeFigureOut">
               <a:rPr lang="ru-RU" smtClean="0"/>
-              <a:t>27.04.2020</a:t>
+              <a:t>07.06.2020</a:t>
             </a:fld>
             <a:endParaRPr lang="ru-RU"/>
           </a:p>
@@ -13955,53 +13955,6 @@
           </a:p>
         </p:txBody>
       </p:sp>
-      <p:sp>
-        <p:nvSpPr>
-          <p:cNvPr id="3" name="Подзаголовок 2">
-            <a:extLst>
-              <a:ext uri="{FF2B5EF4-FFF2-40B4-BE49-F238E27FC236}">
-                <a16:creationId xmlns:a16="http://schemas.microsoft.com/office/drawing/2014/main" id="{F087B6A5-1D25-47C7-8499-1C667799ADF8}"/>
-              </a:ext>
-            </a:extLst>
-          </p:cNvPr>
-          <p:cNvSpPr>
-            <a:spLocks noGrp="1"/>
-          </p:cNvSpPr>
-          <p:nvPr>
-            <p:ph type="subTitle" idx="1"/>
-          </p:nvPr>
-        </p:nvSpPr>
-        <p:spPr>
-          <a:xfrm>
-            <a:off x="1154955" y="4777379"/>
-            <a:ext cx="8825658" cy="1942203"/>
-          </a:xfrm>
-        </p:spPr>
-        <p:txBody>
-          <a:bodyPr>
-            <a:normAutofit/>
-          </a:bodyPr>
-          <a:lstStyle/>
-          <a:p>
-            <a:r>
-              <a:rPr lang="ru-RU" dirty="0"/>
-              <a:t>Бакин Денис</a:t>
-            </a:r>
-          </a:p>
-          <a:p>
-            <a:r>
-              <a:rPr lang="ru-RU" dirty="0"/>
-              <a:t>Стрела Артемий</a:t>
-            </a:r>
-          </a:p>
-          <a:p>
-            <a:r>
-              <a:rPr lang="ru-RU" dirty="0"/>
-              <a:t>Овчаров Роман</a:t>
-            </a:r>
-          </a:p>
-        </p:txBody>
-      </p:sp>
       <p:pic>
         <p:nvPicPr>
           <p:cNvPr id="5" name="Рисунок 4">

</xml_diff>